<commit_message>
Changed it a little, and don't worry about the subheadings below the Information System Diagram, they're just for my reference. There are our tasks in the powerpoint document, and there is also a system in context diagram in there.*
</commit_message>
<xml_diff>
--- a/IPT Assignment 3 conext diagram draft.pptx
+++ b/IPT Assignment 3 conext diagram draft.pptx
@@ -6,6 +6,8 @@
   </p:sldMasterIdLst>
   <p:sldIdLst>
     <p:sldId id="256" r:id="rId2"/>
+    <p:sldId id="257" r:id="rId3"/>
+    <p:sldId id="258" r:id="rId4"/>
   </p:sldIdLst>
   <p:sldSz cx="9144000" cy="6858000" type="screen4x3"/>
   <p:notesSz cx="6858000" cy="9144000"/>
@@ -288,7 +290,8 @@
           <a:p>
             <a:fld id="{0364A21D-0E61-4C46-BA5F-E34BB866134C}" type="datetimeFigureOut">
               <a:rPr lang="en-US" smtClean="0"/>
-              <a:t>9/06/2014</a:t>
+              <a:pPr/>
+              <a:t>6/9/2014</a:t>
             </a:fld>
             <a:endParaRPr lang="en-US"/>
           </a:p>
@@ -330,6 +333,7 @@
           <a:p>
             <a:fld id="{340AA482-C9C2-A642-8734-2562141777EA}" type="slidenum">
               <a:rPr lang="en-US" smtClean="0"/>
+              <a:pPr/>
               <a:t>‹#›</a:t>
             </a:fld>
             <a:endParaRPr lang="en-US"/>
@@ -339,7 +343,7 @@
     </p:spTree>
     <p:extLst>
       <p:ext uri="{BB962C8B-B14F-4D97-AF65-F5344CB8AC3E}">
-        <p14:creationId xmlns:p14="http://schemas.microsoft.com/office/powerpoint/2010/main" val="90899127"/>
+        <p14:creationId xmlns:p14="http://schemas.microsoft.com/office/powerpoint/2010/main" xmlns="" val="90899127"/>
       </p:ext>
     </p:extLst>
   </p:cSld>
@@ -458,7 +462,8 @@
           <a:p>
             <a:fld id="{0364A21D-0E61-4C46-BA5F-E34BB866134C}" type="datetimeFigureOut">
               <a:rPr lang="en-US" smtClean="0"/>
-              <a:t>9/06/2014</a:t>
+              <a:pPr/>
+              <a:t>6/9/2014</a:t>
             </a:fld>
             <a:endParaRPr lang="en-US"/>
           </a:p>
@@ -500,6 +505,7 @@
           <a:p>
             <a:fld id="{340AA482-C9C2-A642-8734-2562141777EA}" type="slidenum">
               <a:rPr lang="en-US" smtClean="0"/>
+              <a:pPr/>
               <a:t>‹#›</a:t>
             </a:fld>
             <a:endParaRPr lang="en-US"/>
@@ -509,7 +515,7 @@
     </p:spTree>
     <p:extLst>
       <p:ext uri="{BB962C8B-B14F-4D97-AF65-F5344CB8AC3E}">
-        <p14:creationId xmlns:p14="http://schemas.microsoft.com/office/powerpoint/2010/main" val="1229063876"/>
+        <p14:creationId xmlns:p14="http://schemas.microsoft.com/office/powerpoint/2010/main" xmlns="" val="1229063876"/>
       </p:ext>
     </p:extLst>
   </p:cSld>
@@ -638,7 +644,8 @@
           <a:p>
             <a:fld id="{0364A21D-0E61-4C46-BA5F-E34BB866134C}" type="datetimeFigureOut">
               <a:rPr lang="en-US" smtClean="0"/>
-              <a:t>9/06/2014</a:t>
+              <a:pPr/>
+              <a:t>6/9/2014</a:t>
             </a:fld>
             <a:endParaRPr lang="en-US"/>
           </a:p>
@@ -680,6 +687,7 @@
           <a:p>
             <a:fld id="{340AA482-C9C2-A642-8734-2562141777EA}" type="slidenum">
               <a:rPr lang="en-US" smtClean="0"/>
+              <a:pPr/>
               <a:t>‹#›</a:t>
             </a:fld>
             <a:endParaRPr lang="en-US"/>
@@ -689,7 +697,7 @@
     </p:spTree>
     <p:extLst>
       <p:ext uri="{BB962C8B-B14F-4D97-AF65-F5344CB8AC3E}">
-        <p14:creationId xmlns:p14="http://schemas.microsoft.com/office/powerpoint/2010/main" val="1572332214"/>
+        <p14:creationId xmlns:p14="http://schemas.microsoft.com/office/powerpoint/2010/main" xmlns="" val="1572332214"/>
       </p:ext>
     </p:extLst>
   </p:cSld>
@@ -808,7 +816,8 @@
           <a:p>
             <a:fld id="{0364A21D-0E61-4C46-BA5F-E34BB866134C}" type="datetimeFigureOut">
               <a:rPr lang="en-US" smtClean="0"/>
-              <a:t>9/06/2014</a:t>
+              <a:pPr/>
+              <a:t>6/9/2014</a:t>
             </a:fld>
             <a:endParaRPr lang="en-US"/>
           </a:p>
@@ -850,6 +859,7 @@
           <a:p>
             <a:fld id="{340AA482-C9C2-A642-8734-2562141777EA}" type="slidenum">
               <a:rPr lang="en-US" smtClean="0"/>
+              <a:pPr/>
               <a:t>‹#›</a:t>
             </a:fld>
             <a:endParaRPr lang="en-US"/>
@@ -859,7 +869,7 @@
     </p:spTree>
     <p:extLst>
       <p:ext uri="{BB962C8B-B14F-4D97-AF65-F5344CB8AC3E}">
-        <p14:creationId xmlns:p14="http://schemas.microsoft.com/office/powerpoint/2010/main" val="1004615951"/>
+        <p14:creationId xmlns:p14="http://schemas.microsoft.com/office/powerpoint/2010/main" xmlns="" val="1004615951"/>
       </p:ext>
     </p:extLst>
   </p:cSld>
@@ -1054,7 +1064,8 @@
           <a:p>
             <a:fld id="{0364A21D-0E61-4C46-BA5F-E34BB866134C}" type="datetimeFigureOut">
               <a:rPr lang="en-US" smtClean="0"/>
-              <a:t>9/06/2014</a:t>
+              <a:pPr/>
+              <a:t>6/9/2014</a:t>
             </a:fld>
             <a:endParaRPr lang="en-US"/>
           </a:p>
@@ -1096,6 +1107,7 @@
           <a:p>
             <a:fld id="{340AA482-C9C2-A642-8734-2562141777EA}" type="slidenum">
               <a:rPr lang="en-US" smtClean="0"/>
+              <a:pPr/>
               <a:t>‹#›</a:t>
             </a:fld>
             <a:endParaRPr lang="en-US"/>
@@ -1105,7 +1117,7 @@
     </p:spTree>
     <p:extLst>
       <p:ext uri="{BB962C8B-B14F-4D97-AF65-F5344CB8AC3E}">
-        <p14:creationId xmlns:p14="http://schemas.microsoft.com/office/powerpoint/2010/main" val="1079142289"/>
+        <p14:creationId xmlns:p14="http://schemas.microsoft.com/office/powerpoint/2010/main" xmlns="" val="1079142289"/>
       </p:ext>
     </p:extLst>
   </p:cSld>
@@ -1342,7 +1354,8 @@
           <a:p>
             <a:fld id="{0364A21D-0E61-4C46-BA5F-E34BB866134C}" type="datetimeFigureOut">
               <a:rPr lang="en-US" smtClean="0"/>
-              <a:t>9/06/2014</a:t>
+              <a:pPr/>
+              <a:t>6/9/2014</a:t>
             </a:fld>
             <a:endParaRPr lang="en-US"/>
           </a:p>
@@ -1384,6 +1397,7 @@
           <a:p>
             <a:fld id="{340AA482-C9C2-A642-8734-2562141777EA}" type="slidenum">
               <a:rPr lang="en-US" smtClean="0"/>
+              <a:pPr/>
               <a:t>‹#›</a:t>
             </a:fld>
             <a:endParaRPr lang="en-US"/>
@@ -1393,7 +1407,7 @@
     </p:spTree>
     <p:extLst>
       <p:ext uri="{BB962C8B-B14F-4D97-AF65-F5344CB8AC3E}">
-        <p14:creationId xmlns:p14="http://schemas.microsoft.com/office/powerpoint/2010/main" val="2034159428"/>
+        <p14:creationId xmlns:p14="http://schemas.microsoft.com/office/powerpoint/2010/main" xmlns="" val="2034159428"/>
       </p:ext>
     </p:extLst>
   </p:cSld>
@@ -1764,7 +1778,8 @@
           <a:p>
             <a:fld id="{0364A21D-0E61-4C46-BA5F-E34BB866134C}" type="datetimeFigureOut">
               <a:rPr lang="en-US" smtClean="0"/>
-              <a:t>9/06/2014</a:t>
+              <a:pPr/>
+              <a:t>6/9/2014</a:t>
             </a:fld>
             <a:endParaRPr lang="en-US"/>
           </a:p>
@@ -1806,6 +1821,7 @@
           <a:p>
             <a:fld id="{340AA482-C9C2-A642-8734-2562141777EA}" type="slidenum">
               <a:rPr lang="en-US" smtClean="0"/>
+              <a:pPr/>
               <a:t>‹#›</a:t>
             </a:fld>
             <a:endParaRPr lang="en-US"/>
@@ -1815,7 +1831,7 @@
     </p:spTree>
     <p:extLst>
       <p:ext uri="{BB962C8B-B14F-4D97-AF65-F5344CB8AC3E}">
-        <p14:creationId xmlns:p14="http://schemas.microsoft.com/office/powerpoint/2010/main" val="689484028"/>
+        <p14:creationId xmlns:p14="http://schemas.microsoft.com/office/powerpoint/2010/main" xmlns="" val="689484028"/>
       </p:ext>
     </p:extLst>
   </p:cSld>
@@ -1882,7 +1898,8 @@
           <a:p>
             <a:fld id="{0364A21D-0E61-4C46-BA5F-E34BB866134C}" type="datetimeFigureOut">
               <a:rPr lang="en-US" smtClean="0"/>
-              <a:t>9/06/2014</a:t>
+              <a:pPr/>
+              <a:t>6/9/2014</a:t>
             </a:fld>
             <a:endParaRPr lang="en-US"/>
           </a:p>
@@ -1924,6 +1941,7 @@
           <a:p>
             <a:fld id="{340AA482-C9C2-A642-8734-2562141777EA}" type="slidenum">
               <a:rPr lang="en-US" smtClean="0"/>
+              <a:pPr/>
               <a:t>‹#›</a:t>
             </a:fld>
             <a:endParaRPr lang="en-US"/>
@@ -1933,7 +1951,7 @@
     </p:spTree>
     <p:extLst>
       <p:ext uri="{BB962C8B-B14F-4D97-AF65-F5344CB8AC3E}">
-        <p14:creationId xmlns:p14="http://schemas.microsoft.com/office/powerpoint/2010/main" val="1147112663"/>
+        <p14:creationId xmlns:p14="http://schemas.microsoft.com/office/powerpoint/2010/main" xmlns="" val="1147112663"/>
       </p:ext>
     </p:extLst>
   </p:cSld>
@@ -1977,7 +1995,8 @@
           <a:p>
             <a:fld id="{0364A21D-0E61-4C46-BA5F-E34BB866134C}" type="datetimeFigureOut">
               <a:rPr lang="en-US" smtClean="0"/>
-              <a:t>9/06/2014</a:t>
+              <a:pPr/>
+              <a:t>6/9/2014</a:t>
             </a:fld>
             <a:endParaRPr lang="en-US"/>
           </a:p>
@@ -2019,6 +2038,7 @@
           <a:p>
             <a:fld id="{340AA482-C9C2-A642-8734-2562141777EA}" type="slidenum">
               <a:rPr lang="en-US" smtClean="0"/>
+              <a:pPr/>
               <a:t>‹#›</a:t>
             </a:fld>
             <a:endParaRPr lang="en-US"/>
@@ -2028,7 +2048,7 @@
     </p:spTree>
     <p:extLst>
       <p:ext uri="{BB962C8B-B14F-4D97-AF65-F5344CB8AC3E}">
-        <p14:creationId xmlns:p14="http://schemas.microsoft.com/office/powerpoint/2010/main" val="2601296092"/>
+        <p14:creationId xmlns:p14="http://schemas.microsoft.com/office/powerpoint/2010/main" xmlns="" val="2601296092"/>
       </p:ext>
     </p:extLst>
   </p:cSld>
@@ -2254,7 +2274,8 @@
           <a:p>
             <a:fld id="{0364A21D-0E61-4C46-BA5F-E34BB866134C}" type="datetimeFigureOut">
               <a:rPr lang="en-US" smtClean="0"/>
-              <a:t>9/06/2014</a:t>
+              <a:pPr/>
+              <a:t>6/9/2014</a:t>
             </a:fld>
             <a:endParaRPr lang="en-US"/>
           </a:p>
@@ -2296,6 +2317,7 @@
           <a:p>
             <a:fld id="{340AA482-C9C2-A642-8734-2562141777EA}" type="slidenum">
               <a:rPr lang="en-US" smtClean="0"/>
+              <a:pPr/>
               <a:t>‹#›</a:t>
             </a:fld>
             <a:endParaRPr lang="en-US"/>
@@ -2305,7 +2327,7 @@
     </p:spTree>
     <p:extLst>
       <p:ext uri="{BB962C8B-B14F-4D97-AF65-F5344CB8AC3E}">
-        <p14:creationId xmlns:p14="http://schemas.microsoft.com/office/powerpoint/2010/main" val="2982841859"/>
+        <p14:creationId xmlns:p14="http://schemas.microsoft.com/office/powerpoint/2010/main" xmlns="" val="2982841859"/>
       </p:ext>
     </p:extLst>
   </p:cSld>
@@ -2507,7 +2529,8 @@
           <a:p>
             <a:fld id="{0364A21D-0E61-4C46-BA5F-E34BB866134C}" type="datetimeFigureOut">
               <a:rPr lang="en-US" smtClean="0"/>
-              <a:t>9/06/2014</a:t>
+              <a:pPr/>
+              <a:t>6/9/2014</a:t>
             </a:fld>
             <a:endParaRPr lang="en-US"/>
           </a:p>
@@ -2549,6 +2572,7 @@
           <a:p>
             <a:fld id="{340AA482-C9C2-A642-8734-2562141777EA}" type="slidenum">
               <a:rPr lang="en-US" smtClean="0"/>
+              <a:pPr/>
               <a:t>‹#›</a:t>
             </a:fld>
             <a:endParaRPr lang="en-US"/>
@@ -2558,7 +2582,7 @@
     </p:spTree>
     <p:extLst>
       <p:ext uri="{BB962C8B-B14F-4D97-AF65-F5344CB8AC3E}">
-        <p14:creationId xmlns:p14="http://schemas.microsoft.com/office/powerpoint/2010/main" val="3929544382"/>
+        <p14:creationId xmlns:p14="http://schemas.microsoft.com/office/powerpoint/2010/main" xmlns="" val="3929544382"/>
       </p:ext>
     </p:extLst>
   </p:cSld>
@@ -2720,7 +2744,8 @@
           <a:p>
             <a:fld id="{0364A21D-0E61-4C46-BA5F-E34BB866134C}" type="datetimeFigureOut">
               <a:rPr lang="en-US" smtClean="0"/>
-              <a:t>9/06/2014</a:t>
+              <a:pPr/>
+              <a:t>6/9/2014</a:t>
             </a:fld>
             <a:endParaRPr lang="en-US"/>
           </a:p>
@@ -2798,6 +2823,7 @@
           <a:p>
             <a:fld id="{340AA482-C9C2-A642-8734-2562141777EA}" type="slidenum">
               <a:rPr lang="en-US" smtClean="0"/>
+              <a:pPr/>
               <a:t>‹#›</a:t>
             </a:fld>
             <a:endParaRPr lang="en-US"/>
@@ -2807,7 +2833,7 @@
     </p:spTree>
     <p:extLst>
       <p:ext uri="{BB962C8B-B14F-4D97-AF65-F5344CB8AC3E}">
-        <p14:creationId xmlns:p14="http://schemas.microsoft.com/office/powerpoint/2010/main" val="3963951516"/>
+        <p14:creationId xmlns:p14="http://schemas.microsoft.com/office/powerpoint/2010/main" xmlns="" val="3963951516"/>
       </p:ext>
     </p:extLst>
   </p:cSld>
@@ -3141,7 +3167,7 @@
         </p:nvSpPr>
         <p:spPr>
           <a:xfrm>
-            <a:off x="2983106" y="1455786"/>
+            <a:off x="2949204" y="1149005"/>
             <a:ext cx="3198753" cy="563138"/>
           </a:xfrm>
           <a:prstGeom prst="rect">
@@ -3168,10 +3194,26 @@
           <a:p>
             <a:pPr algn="ctr"/>
             <a:r>
-              <a:rPr lang="en-US" dirty="0" smtClean="0"/>
+              <a:rPr lang="en-US" sz="2000" b="1" dirty="0" smtClean="0">
+                <a:effectLst>
+                  <a:outerShdw blurRad="38100" dist="38100" dir="2700000" algn="tl">
+                    <a:srgbClr val="000000">
+                      <a:alpha val="43137"/>
+                    </a:srgbClr>
+                  </a:outerShdw>
+                </a:effectLst>
+              </a:rPr>
               <a:t>Purpose</a:t>
             </a:r>
-            <a:endParaRPr lang="en-US" dirty="0"/>
+            <a:endParaRPr lang="en-US" sz="2000" b="1" dirty="0">
+              <a:effectLst>
+                <a:outerShdw blurRad="38100" dist="38100" dir="2700000" algn="tl">
+                  <a:srgbClr val="000000">
+                    <a:alpha val="43137"/>
+                  </a:srgbClr>
+                </a:outerShdw>
+              </a:effectLst>
+            </a:endParaRPr>
           </a:p>
         </p:txBody>
       </p:sp>
@@ -3183,8 +3225,8 @@
         </p:nvSpPr>
         <p:spPr>
           <a:xfrm>
-            <a:off x="1665269" y="2830318"/>
-            <a:ext cx="5822448" cy="563138"/>
+            <a:off x="1665269" y="1858945"/>
+            <a:ext cx="5822448" cy="2371411"/>
           </a:xfrm>
           <a:prstGeom prst="rect">
             <a:avLst/>
@@ -3210,10 +3252,101 @@
           <a:p>
             <a:pPr algn="ctr"/>
             <a:r>
-              <a:rPr lang="en-US" dirty="0" smtClean="0"/>
+              <a:rPr lang="en-US" sz="2000" b="1" dirty="0" smtClean="0">
+                <a:effectLst>
+                  <a:outerShdw blurRad="38100" dist="38100" dir="2700000" algn="tl">
+                    <a:srgbClr val="000000">
+                      <a:alpha val="43137"/>
+                    </a:srgbClr>
+                  </a:outerShdw>
+                </a:effectLst>
+              </a:rPr>
               <a:t>Information Processes</a:t>
             </a:r>
-            <a:endParaRPr lang="en-US" dirty="0"/>
+          </a:p>
+          <a:p>
+            <a:pPr algn="ctr"/>
+            <a:endParaRPr lang="en-US" sz="2000" b="1" dirty="0" smtClean="0">
+              <a:effectLst>
+                <a:outerShdw blurRad="38100" dist="38100" dir="2700000" algn="tl">
+                  <a:srgbClr val="000000">
+                    <a:alpha val="43137"/>
+                  </a:srgbClr>
+                </a:outerShdw>
+              </a:effectLst>
+            </a:endParaRPr>
+          </a:p>
+          <a:p>
+            <a:pPr algn="ctr"/>
+            <a:endParaRPr lang="en-US" sz="2000" b="1" dirty="0" smtClean="0">
+              <a:effectLst>
+                <a:outerShdw blurRad="38100" dist="38100" dir="2700000" algn="tl">
+                  <a:srgbClr val="000000">
+                    <a:alpha val="43137"/>
+                  </a:srgbClr>
+                </a:outerShdw>
+              </a:effectLst>
+            </a:endParaRPr>
+          </a:p>
+          <a:p>
+            <a:pPr algn="ctr"/>
+            <a:endParaRPr lang="en-US" sz="2000" b="1" dirty="0" smtClean="0">
+              <a:effectLst>
+                <a:outerShdw blurRad="38100" dist="38100" dir="2700000" algn="tl">
+                  <a:srgbClr val="000000">
+                    <a:alpha val="43137"/>
+                  </a:srgbClr>
+                </a:outerShdw>
+              </a:effectLst>
+            </a:endParaRPr>
+          </a:p>
+          <a:p>
+            <a:pPr algn="ctr"/>
+            <a:endParaRPr lang="en-US" sz="2000" b="1" dirty="0" smtClean="0">
+              <a:effectLst>
+                <a:outerShdw blurRad="38100" dist="38100" dir="2700000" algn="tl">
+                  <a:srgbClr val="000000">
+                    <a:alpha val="43137"/>
+                  </a:srgbClr>
+                </a:outerShdw>
+              </a:effectLst>
+            </a:endParaRPr>
+          </a:p>
+          <a:p>
+            <a:pPr algn="ctr"/>
+            <a:endParaRPr lang="en-US" sz="2000" b="1" dirty="0" smtClean="0">
+              <a:effectLst>
+                <a:outerShdw blurRad="38100" dist="38100" dir="2700000" algn="tl">
+                  <a:srgbClr val="000000">
+                    <a:alpha val="43137"/>
+                  </a:srgbClr>
+                </a:outerShdw>
+              </a:effectLst>
+            </a:endParaRPr>
+          </a:p>
+          <a:p>
+            <a:pPr algn="ctr"/>
+            <a:endParaRPr lang="en-US" sz="2000" b="1" dirty="0" smtClean="0">
+              <a:effectLst>
+                <a:outerShdw blurRad="38100" dist="38100" dir="2700000" algn="tl">
+                  <a:srgbClr val="000000">
+                    <a:alpha val="43137"/>
+                  </a:srgbClr>
+                </a:outerShdw>
+              </a:effectLst>
+            </a:endParaRPr>
+          </a:p>
+          <a:p>
+            <a:pPr algn="ctr"/>
+            <a:endParaRPr lang="en-US" sz="2000" b="1" dirty="0">
+              <a:effectLst>
+                <a:outerShdw blurRad="38100" dist="38100" dir="2700000" algn="tl">
+                  <a:srgbClr val="000000">
+                    <a:alpha val="43137"/>
+                  </a:srgbClr>
+                </a:outerShdw>
+              </a:effectLst>
+            </a:endParaRPr>
           </a:p>
         </p:txBody>
       </p:sp>
@@ -3252,10 +3385,26 @@
           <a:p>
             <a:pPr algn="ctr"/>
             <a:r>
-              <a:rPr lang="en-US" dirty="0" smtClean="0"/>
+              <a:rPr lang="en-US" b="1" dirty="0" smtClean="0">
+                <a:effectLst>
+                  <a:outerShdw blurRad="38100" dist="38100" dir="2700000" algn="tl">
+                    <a:srgbClr val="000000">
+                      <a:alpha val="43137"/>
+                    </a:srgbClr>
+                  </a:outerShdw>
+                </a:effectLst>
+              </a:rPr>
               <a:t>Participants</a:t>
             </a:r>
-            <a:endParaRPr lang="en-US" dirty="0"/>
+            <a:endParaRPr lang="en-US" b="1" dirty="0">
+              <a:effectLst>
+                <a:outerShdw blurRad="38100" dist="38100" dir="2700000" algn="tl">
+                  <a:srgbClr val="000000">
+                    <a:alpha val="43137"/>
+                  </a:srgbClr>
+                </a:outerShdw>
+              </a:effectLst>
+            </a:endParaRPr>
           </a:p>
         </p:txBody>
       </p:sp>
@@ -3294,10 +3443,26 @@
           <a:p>
             <a:pPr algn="ctr"/>
             <a:r>
-              <a:rPr lang="en-US" dirty="0" smtClean="0"/>
+              <a:rPr lang="en-US" b="1" dirty="0" smtClean="0">
+                <a:effectLst>
+                  <a:outerShdw blurRad="38100" dist="38100" dir="2700000" algn="tl">
+                    <a:srgbClr val="000000">
+                      <a:alpha val="43137"/>
+                    </a:srgbClr>
+                  </a:outerShdw>
+                </a:effectLst>
+              </a:rPr>
               <a:t>Data/Info</a:t>
             </a:r>
-            <a:endParaRPr lang="en-US" dirty="0"/>
+            <a:endParaRPr lang="en-US" b="1" dirty="0">
+              <a:effectLst>
+                <a:outerShdw blurRad="38100" dist="38100" dir="2700000" algn="tl">
+                  <a:srgbClr val="000000">
+                    <a:alpha val="43137"/>
+                  </a:srgbClr>
+                </a:outerShdw>
+              </a:effectLst>
+            </a:endParaRPr>
           </a:p>
         </p:txBody>
       </p:sp>
@@ -3336,10 +3501,26 @@
           <a:p>
             <a:pPr algn="ctr"/>
             <a:r>
-              <a:rPr lang="en-US" dirty="0" smtClean="0"/>
+              <a:rPr lang="en-US" b="1" dirty="0" smtClean="0">
+                <a:effectLst>
+                  <a:outerShdw blurRad="38100" dist="38100" dir="2700000" algn="tl">
+                    <a:srgbClr val="000000">
+                      <a:alpha val="43137"/>
+                    </a:srgbClr>
+                  </a:outerShdw>
+                </a:effectLst>
+              </a:rPr>
               <a:t>Information Tech</a:t>
             </a:r>
-            <a:endParaRPr lang="en-US" dirty="0"/>
+            <a:endParaRPr lang="en-US" b="1" dirty="0">
+              <a:effectLst>
+                <a:outerShdw blurRad="38100" dist="38100" dir="2700000" algn="tl">
+                  <a:srgbClr val="000000">
+                    <a:alpha val="43137"/>
+                  </a:srgbClr>
+                </a:outerShdw>
+              </a:effectLst>
+            </a:endParaRPr>
           </a:p>
         </p:txBody>
       </p:sp>
@@ -3541,8 +3722,8 @@
         </p:nvCxnSpPr>
         <p:spPr>
           <a:xfrm flipH="1">
-            <a:off x="4548581" y="532134"/>
-            <a:ext cx="1106143" cy="898440"/>
+            <a:off x="4702629" y="532134"/>
+            <a:ext cx="952096" cy="616871"/>
           </a:xfrm>
           <a:prstGeom prst="line">
             <a:avLst/>
@@ -4110,12 +4291,271 @@
           </a:p>
         </p:txBody>
       </p:sp>
+      <p:sp>
+        <p:nvSpPr>
+          <p:cNvPr id="30" name="TextBox 29"/>
+          <p:cNvSpPr txBox="1"/>
+          <p:nvPr/>
+        </p:nvSpPr>
+        <p:spPr>
+          <a:xfrm>
+            <a:off x="1934012" y="2199031"/>
+            <a:ext cx="3184073" cy="1815882"/>
+          </a:xfrm>
+          <a:prstGeom prst="rect">
+            <a:avLst/>
+          </a:prstGeom>
+          <a:noFill/>
+        </p:spPr>
+        <p:txBody>
+          <a:bodyPr wrap="square" rtlCol="0">
+            <a:spAutoFit/>
+          </a:bodyPr>
+          <a:lstStyle/>
+          <a:p>
+            <a:pPr>
+              <a:buFont typeface="Wingdings" pitchFamily="2" charset="2"/>
+              <a:buChar char="ü"/>
+            </a:pPr>
+            <a:r>
+              <a:rPr lang="en-AU" sz="1600" dirty="0" smtClean="0">
+                <a:solidFill>
+                  <a:schemeClr val="bg1"/>
+                </a:solidFill>
+              </a:rPr>
+              <a:t>Collecting</a:t>
+            </a:r>
+          </a:p>
+          <a:p>
+            <a:pPr>
+              <a:buFont typeface="Wingdings" pitchFamily="2" charset="2"/>
+              <a:buChar char="ü"/>
+            </a:pPr>
+            <a:r>
+              <a:rPr lang="en-AU" sz="1600" dirty="0" smtClean="0">
+                <a:solidFill>
+                  <a:schemeClr val="bg1"/>
+                </a:solidFill>
+              </a:rPr>
+              <a:t>Organising</a:t>
+            </a:r>
+          </a:p>
+          <a:p>
+            <a:pPr>
+              <a:buFont typeface="Wingdings" pitchFamily="2" charset="2"/>
+              <a:buChar char="ü"/>
+            </a:pPr>
+            <a:r>
+              <a:rPr lang="en-AU" sz="1600" dirty="0" smtClean="0">
+                <a:solidFill>
+                  <a:schemeClr val="bg1"/>
+                </a:solidFill>
+              </a:rPr>
+              <a:t>Analysing</a:t>
+            </a:r>
+          </a:p>
+          <a:p>
+            <a:pPr>
+              <a:buFont typeface="Wingdings" pitchFamily="2" charset="2"/>
+              <a:buChar char="ü"/>
+            </a:pPr>
+            <a:r>
+              <a:rPr lang="en-AU" sz="1600" dirty="0" smtClean="0">
+                <a:solidFill>
+                  <a:schemeClr val="bg1"/>
+                </a:solidFill>
+              </a:rPr>
+              <a:t>Storing and retrieving</a:t>
+            </a:r>
+          </a:p>
+          <a:p>
+            <a:pPr>
+              <a:buFont typeface="Wingdings" pitchFamily="2" charset="2"/>
+              <a:buChar char="ü"/>
+            </a:pPr>
+            <a:r>
+              <a:rPr lang="en-AU" sz="1600" dirty="0" smtClean="0">
+                <a:solidFill>
+                  <a:schemeClr val="bg1"/>
+                </a:solidFill>
+              </a:rPr>
+              <a:t>Processing</a:t>
+            </a:r>
+          </a:p>
+          <a:p>
+            <a:pPr>
+              <a:buFont typeface="Wingdings" pitchFamily="2" charset="2"/>
+              <a:buChar char="ü"/>
+            </a:pPr>
+            <a:r>
+              <a:rPr lang="en-AU" sz="1600" dirty="0" smtClean="0">
+                <a:solidFill>
+                  <a:schemeClr val="bg1"/>
+                </a:solidFill>
+              </a:rPr>
+              <a:t>Transmitting and receiving</a:t>
+            </a:r>
+          </a:p>
+          <a:p>
+            <a:pPr>
+              <a:buFont typeface="Wingdings" pitchFamily="2" charset="2"/>
+              <a:buChar char="ü"/>
+            </a:pPr>
+            <a:r>
+              <a:rPr lang="en-AU" sz="1600" dirty="0" smtClean="0">
+                <a:solidFill>
+                  <a:schemeClr val="bg1"/>
+                </a:solidFill>
+              </a:rPr>
+              <a:t>Displaying</a:t>
+            </a:r>
+            <a:endParaRPr lang="en-AU" sz="1600" dirty="0">
+              <a:solidFill>
+                <a:schemeClr val="bg1"/>
+              </a:solidFill>
+            </a:endParaRPr>
+          </a:p>
+        </p:txBody>
+      </p:sp>
     </p:spTree>
     <p:extLst>
       <p:ext uri="{BB962C8B-B14F-4D97-AF65-F5344CB8AC3E}">
-        <p14:creationId xmlns:p14="http://schemas.microsoft.com/office/powerpoint/2010/main" val="3817009021"/>
+        <p14:creationId xmlns:p14="http://schemas.microsoft.com/office/powerpoint/2010/main" xmlns="" val="3817009021"/>
       </p:ext>
     </p:extLst>
+  </p:cSld>
+  <p:clrMapOvr>
+    <a:masterClrMapping/>
+  </p:clrMapOvr>
+</p:sld>
+</file>
+
+<file path=ppt/slides/slide2.xml><?xml version="1.0" encoding="utf-8"?>
+<p:sld xmlns:a="http://schemas.openxmlformats.org/drawingml/2006/main" xmlns:r="http://schemas.openxmlformats.org/officeDocument/2006/relationships" xmlns:p="http://schemas.openxmlformats.org/presentationml/2006/main">
+  <p:cSld>
+    <p:spTree>
+      <p:nvGrpSpPr>
+        <p:cNvPr id="1" name=""/>
+        <p:cNvGrpSpPr/>
+        <p:nvPr/>
+      </p:nvGrpSpPr>
+      <p:grpSpPr>
+        <a:xfrm>
+          <a:off x="0" y="0"/>
+          <a:ext cx="0" cy="0"/>
+          <a:chOff x="0" y="0"/>
+          <a:chExt cx="0" cy="0"/>
+        </a:xfrm>
+      </p:grpSpPr>
+      <p:sp>
+        <p:nvSpPr>
+          <p:cNvPr id="2" name="Title 1"/>
+          <p:cNvSpPr>
+            <a:spLocks noGrp="1"/>
+          </p:cNvSpPr>
+          <p:nvPr>
+            <p:ph type="title"/>
+          </p:nvPr>
+        </p:nvSpPr>
+        <p:spPr>
+          <a:xfrm>
+            <a:off x="457200" y="0"/>
+            <a:ext cx="8229600" cy="529230"/>
+          </a:xfrm>
+        </p:spPr>
+        <p:txBody>
+          <a:bodyPr>
+            <a:normAutofit fontScale="90000"/>
+          </a:bodyPr>
+          <a:lstStyle/>
+          <a:p>
+            <a:r>
+              <a:rPr lang="en-AU" dirty="0" smtClean="0"/>
+              <a:t>Our tasks for discussion</a:t>
+            </a:r>
+            <a:endParaRPr lang="en-AU" dirty="0"/>
+          </a:p>
+        </p:txBody>
+      </p:sp>
+      <p:graphicFrame>
+        <p:nvGraphicFramePr>
+          <p:cNvPr id="1026" name="Object 2"/>
+          <p:cNvGraphicFramePr>
+            <a:graphicFrameLocks noChangeAspect="1"/>
+          </p:cNvGraphicFramePr>
+          <p:nvPr/>
+        </p:nvGraphicFramePr>
+        <p:xfrm>
+          <a:off x="457200" y="529231"/>
+          <a:ext cx="8049965" cy="6194342"/>
+        </p:xfrm>
+        <a:graphic>
+          <a:graphicData uri="http://schemas.openxmlformats.org/presentationml/2006/ole">
+            <p:oleObj spid="_x0000_s1026" name="Document" r:id="rId3" imgW="5872902" imgH="4404129" progId="Word.Document.12">
+              <p:embed/>
+            </p:oleObj>
+          </a:graphicData>
+        </a:graphic>
+      </p:graphicFrame>
+    </p:spTree>
+  </p:cSld>
+  <p:clrMapOvr>
+    <a:masterClrMapping/>
+  </p:clrMapOvr>
+</p:sld>
+</file>
+
+<file path=ppt/slides/slide3.xml><?xml version="1.0" encoding="utf-8"?>
+<p:sld xmlns:a="http://schemas.openxmlformats.org/drawingml/2006/main" xmlns:r="http://schemas.openxmlformats.org/officeDocument/2006/relationships" xmlns:p="http://schemas.openxmlformats.org/presentationml/2006/main">
+  <p:cSld>
+    <p:spTree>
+      <p:nvGrpSpPr>
+        <p:cNvPr id="1" name=""/>
+        <p:cNvGrpSpPr/>
+        <p:nvPr/>
+      </p:nvGrpSpPr>
+      <p:grpSpPr>
+        <a:xfrm>
+          <a:off x="0" y="0"/>
+          <a:ext cx="0" cy="0"/>
+          <a:chOff x="0" y="0"/>
+          <a:chExt cx="0" cy="0"/>
+        </a:xfrm>
+      </p:grpSpPr>
+      <p:pic>
+        <p:nvPicPr>
+          <p:cNvPr id="15362" name="Picture 2"/>
+          <p:cNvPicPr>
+            <a:picLocks noChangeAspect="1" noChangeArrowheads="1"/>
+          </p:cNvPicPr>
+          <p:nvPr/>
+        </p:nvPicPr>
+        <p:blipFill>
+          <a:blip r:embed="rId2"/>
+          <a:srcRect/>
+          <a:stretch>
+            <a:fillRect/>
+          </a:stretch>
+        </p:blipFill>
+        <p:spPr bwMode="auto">
+          <a:xfrm>
+            <a:off x="1709738" y="0"/>
+            <a:ext cx="5722937" cy="6761198"/>
+          </a:xfrm>
+          <a:prstGeom prst="rect">
+            <a:avLst/>
+          </a:prstGeom>
+          <a:noFill/>
+          <a:ln w="9525">
+            <a:noFill/>
+            <a:miter lim="800000"/>
+            <a:headEnd/>
+            <a:tailEnd/>
+          </a:ln>
+          <a:effectLst/>
+        </p:spPr>
+      </p:pic>
+    </p:spTree>
   </p:cSld>
   <p:clrMapOvr>
     <a:masterClrMapping/>

</xml_diff>